<commit_message>
80x unfiltered NN inputs tested
</commit_message>
<xml_diff>
--- a/UndamagedTraining.pptx
+++ b/UndamagedTraining.pptx
@@ -9,6 +9,8 @@
     <p:sldId id="258" r:id="rId3"/>
     <p:sldId id="259" r:id="rId4"/>
     <p:sldId id="260" r:id="rId5"/>
+    <p:sldId id="263" r:id="rId6"/>
+    <p:sldId id="264" r:id="rId7"/>
   </p:sldIdLst>
   <p:sldSz cx="12192000" cy="6858000"/>
   <p:notesSz cx="6858000" cy="9144000"/>
@@ -107,13 +109,18 @@
       </a:defRPr>
     </a:lvl9pPr>
   </p:defaultTextStyle>
+  <p:extLst>
+    <p:ext uri="{EFAFB233-063F-42B5-8137-9DF3F51BA10A}">
+      <p15:sldGuideLst xmlns:p15="http://schemas.microsoft.com/office/powerpoint/2012/main"/>
+    </p:ext>
+  </p:extLst>
 </p:presentation>
 </file>
 
 <file path=ppt/revisionInfo.xml><?xml version="1.0" encoding="utf-8"?>
 <p1510:revInfo xmlns:a="http://schemas.openxmlformats.org/drawingml/2006/main" xmlns:r="http://schemas.openxmlformats.org/officeDocument/2006/relationships" xmlns:p1510="http://schemas.microsoft.com/office/powerpoint/2015/10/main">
   <p1510:revLst>
-    <p1510:client id="{62BE712C-E7B9-4F91-9C5E-81F27518FB3F}" v="8" dt="2021-10-14T10:34:44.390"/>
+    <p1510:client id="{62BE712C-E7B9-4F91-9C5E-81F27518FB3F}" v="19" dt="2021-10-14T12:04:00.050"/>
   </p1510:revLst>
 </p1510:revInfo>
 </file>
@@ -122,8 +129,8 @@
 <pc:chgInfo xmlns:a="http://schemas.openxmlformats.org/drawingml/2006/main" xmlns:r="http://schemas.openxmlformats.org/officeDocument/2006/relationships" xmlns:ac="http://schemas.microsoft.com/office/drawing/2013/main/command" xmlns:pc="http://schemas.microsoft.com/office/powerpoint/2013/main/command">
   <pc:docChgLst>
     <pc:chgData name="David Hardman" userId="25dc0ef6-7b36-4b30-a7ad-8f7f71a3f84a" providerId="ADAL" clId="{62BE712C-E7B9-4F91-9C5E-81F27518FB3F}"/>
-    <pc:docChg chg="modSld">
-      <pc:chgData name="David Hardman" userId="25dc0ef6-7b36-4b30-a7ad-8f7f71a3f84a" providerId="ADAL" clId="{62BE712C-E7B9-4F91-9C5E-81F27518FB3F}" dt="2021-10-14T10:36:11.092" v="56" actId="113"/>
+    <pc:docChg chg="custSel addSld delSld modSld">
+      <pc:chgData name="David Hardman" userId="25dc0ef6-7b36-4b30-a7ad-8f7f71a3f84a" providerId="ADAL" clId="{62BE712C-E7B9-4F91-9C5E-81F27518FB3F}" dt="2021-10-14T12:04:58.597" v="291" actId="20577"/>
       <pc:docMkLst>
         <pc:docMk/>
       </pc:docMkLst>
@@ -264,6 +271,362 @@
           <ac:picMkLst>
             <pc:docMk/>
             <pc:sldMk cId="1418723755" sldId="260"/>
+            <ac:picMk id="31" creationId="{1ED34797-1D19-4C54-8693-EB1F168B5C56}"/>
+          </ac:picMkLst>
+        </pc:picChg>
+      </pc:sldChg>
+      <pc:sldChg chg="new del">
+        <pc:chgData name="David Hardman" userId="25dc0ef6-7b36-4b30-a7ad-8f7f71a3f84a" providerId="ADAL" clId="{62BE712C-E7B9-4F91-9C5E-81F27518FB3F}" dt="2021-10-14T11:45:02.317" v="62" actId="47"/>
+        <pc:sldMkLst>
+          <pc:docMk/>
+          <pc:sldMk cId="1855851340" sldId="261"/>
+        </pc:sldMkLst>
+      </pc:sldChg>
+      <pc:sldChg chg="delSp new del mod">
+        <pc:chgData name="David Hardman" userId="25dc0ef6-7b36-4b30-a7ad-8f7f71a3f84a" providerId="ADAL" clId="{62BE712C-E7B9-4F91-9C5E-81F27518FB3F}" dt="2021-10-14T11:45:03.026" v="63" actId="47"/>
+        <pc:sldMkLst>
+          <pc:docMk/>
+          <pc:sldMk cId="1636378016" sldId="262"/>
+        </pc:sldMkLst>
+        <pc:spChg chg="del">
+          <ac:chgData name="David Hardman" userId="25dc0ef6-7b36-4b30-a7ad-8f7f71a3f84a" providerId="ADAL" clId="{62BE712C-E7B9-4F91-9C5E-81F27518FB3F}" dt="2021-10-14T11:44:49.648" v="60" actId="478"/>
+          <ac:spMkLst>
+            <pc:docMk/>
+            <pc:sldMk cId="1636378016" sldId="262"/>
+            <ac:spMk id="2" creationId="{2FCBA443-D9FC-4308-A989-8E3AD04E4BB1}"/>
+          </ac:spMkLst>
+        </pc:spChg>
+        <pc:spChg chg="del">
+          <ac:chgData name="David Hardman" userId="25dc0ef6-7b36-4b30-a7ad-8f7f71a3f84a" providerId="ADAL" clId="{62BE712C-E7B9-4F91-9C5E-81F27518FB3F}" dt="2021-10-14T11:44:48.818" v="59" actId="478"/>
+          <ac:spMkLst>
+            <pc:docMk/>
+            <pc:sldMk cId="1636378016" sldId="262"/>
+            <ac:spMk id="3" creationId="{5AB76A25-A248-4B12-9059-97DEF2E2F052}"/>
+          </ac:spMkLst>
+        </pc:spChg>
+      </pc:sldChg>
+      <pc:sldChg chg="addSp delSp modSp add mod">
+        <pc:chgData name="David Hardman" userId="25dc0ef6-7b36-4b30-a7ad-8f7f71a3f84a" providerId="ADAL" clId="{62BE712C-E7B9-4F91-9C5E-81F27518FB3F}" dt="2021-10-14T12:04:58.597" v="291" actId="20577"/>
+        <pc:sldMkLst>
+          <pc:docMk/>
+          <pc:sldMk cId="721809314" sldId="263"/>
+        </pc:sldMkLst>
+        <pc:spChg chg="mod">
+          <ac:chgData name="David Hardman" userId="25dc0ef6-7b36-4b30-a7ad-8f7f71a3f84a" providerId="ADAL" clId="{62BE712C-E7B9-4F91-9C5E-81F27518FB3F}" dt="2021-10-14T11:45:22.416" v="75" actId="20577"/>
+          <ac:spMkLst>
+            <pc:docMk/>
+            <pc:sldMk cId="721809314" sldId="263"/>
+            <ac:spMk id="10" creationId="{27629578-2CE0-4C48-810E-370A6716D34C}"/>
+          </ac:spMkLst>
+        </pc:spChg>
+        <pc:spChg chg="del">
+          <ac:chgData name="David Hardman" userId="25dc0ef6-7b36-4b30-a7ad-8f7f71a3f84a" providerId="ADAL" clId="{62BE712C-E7B9-4F91-9C5E-81F27518FB3F}" dt="2021-10-14T11:45:14.496" v="67" actId="478"/>
+          <ac:spMkLst>
+            <pc:docMk/>
+            <pc:sldMk cId="721809314" sldId="263"/>
+            <ac:spMk id="11" creationId="{CD6C808D-2C2C-4210-AC64-15B6851B229B}"/>
+          </ac:spMkLst>
+        </pc:spChg>
+        <pc:spChg chg="del">
+          <ac:chgData name="David Hardman" userId="25dc0ef6-7b36-4b30-a7ad-8f7f71a3f84a" providerId="ADAL" clId="{62BE712C-E7B9-4F91-9C5E-81F27518FB3F}" dt="2021-10-14T12:03:06.689" v="265" actId="478"/>
+          <ac:spMkLst>
+            <pc:docMk/>
+            <pc:sldMk cId="721809314" sldId="263"/>
+            <ac:spMk id="14" creationId="{F7603AD1-F8F6-4915-AEE5-2ED37B5C529E}"/>
+          </ac:spMkLst>
+        </pc:spChg>
+        <pc:spChg chg="del">
+          <ac:chgData name="David Hardman" userId="25dc0ef6-7b36-4b30-a7ad-8f7f71a3f84a" providerId="ADAL" clId="{62BE712C-E7B9-4F91-9C5E-81F27518FB3F}" dt="2021-10-14T11:45:13.032" v="66" actId="478"/>
+          <ac:spMkLst>
+            <pc:docMk/>
+            <pc:sldMk cId="721809314" sldId="263"/>
+            <ac:spMk id="19" creationId="{938A59B8-79C1-4C42-B137-BC616766575C}"/>
+          </ac:spMkLst>
+        </pc:spChg>
+        <pc:spChg chg="add mod">
+          <ac:chgData name="David Hardman" userId="25dc0ef6-7b36-4b30-a7ad-8f7f71a3f84a" providerId="ADAL" clId="{62BE712C-E7B9-4F91-9C5E-81F27518FB3F}" dt="2021-10-14T12:04:58.597" v="291" actId="20577"/>
+          <ac:spMkLst>
+            <pc:docMk/>
+            <pc:sldMk cId="721809314" sldId="263"/>
+            <ac:spMk id="20" creationId="{6A2F3CC1-2EE2-41B0-9667-CA53918A4C27}"/>
+          </ac:spMkLst>
+        </pc:spChg>
+        <pc:spChg chg="mod">
+          <ac:chgData name="David Hardman" userId="25dc0ef6-7b36-4b30-a7ad-8f7f71a3f84a" providerId="ADAL" clId="{62BE712C-E7B9-4F91-9C5E-81F27518FB3F}" dt="2021-10-14T11:49:28.679" v="241" actId="20577"/>
+          <ac:spMkLst>
+            <pc:docMk/>
+            <pc:sldMk cId="721809314" sldId="263"/>
+            <ac:spMk id="24" creationId="{C61BE213-D958-495D-B5A5-5FF3B61FFDF2}"/>
+          </ac:spMkLst>
+        </pc:spChg>
+        <pc:spChg chg="del mod">
+          <ac:chgData name="David Hardman" userId="25dc0ef6-7b36-4b30-a7ad-8f7f71a3f84a" providerId="ADAL" clId="{62BE712C-E7B9-4F91-9C5E-81F27518FB3F}" dt="2021-10-14T11:45:17.458" v="71" actId="478"/>
+          <ac:spMkLst>
+            <pc:docMk/>
+            <pc:sldMk cId="721809314" sldId="263"/>
+            <ac:spMk id="29" creationId="{5506EBA8-A6E9-45EE-9AF8-5A2E9D895859}"/>
+          </ac:spMkLst>
+        </pc:spChg>
+        <pc:spChg chg="add mod">
+          <ac:chgData name="David Hardman" userId="25dc0ef6-7b36-4b30-a7ad-8f7f71a3f84a" providerId="ADAL" clId="{62BE712C-E7B9-4F91-9C5E-81F27518FB3F}" dt="2021-10-14T12:03:04.807" v="264" actId="1076"/>
+          <ac:spMkLst>
+            <pc:docMk/>
+            <pc:sldMk cId="721809314" sldId="263"/>
+            <ac:spMk id="30" creationId="{A7F5ED5F-31A1-4276-AE36-AADEA80FEB11}"/>
+          </ac:spMkLst>
+        </pc:spChg>
+        <pc:picChg chg="del">
+          <ac:chgData name="David Hardman" userId="25dc0ef6-7b36-4b30-a7ad-8f7f71a3f84a" providerId="ADAL" clId="{62BE712C-E7B9-4F91-9C5E-81F27518FB3F}" dt="2021-10-14T11:48:17.057" v="219" actId="478"/>
+          <ac:picMkLst>
+            <pc:docMk/>
+            <pc:sldMk cId="721809314" sldId="263"/>
+            <ac:picMk id="3" creationId="{2E0CFE22-1288-413B-B5BC-67F267363B8E}"/>
+          </ac:picMkLst>
+        </pc:picChg>
+        <pc:picChg chg="add mod">
+          <ac:chgData name="David Hardman" userId="25dc0ef6-7b36-4b30-a7ad-8f7f71a3f84a" providerId="ADAL" clId="{62BE712C-E7B9-4F91-9C5E-81F27518FB3F}" dt="2021-10-14T11:49:11.556" v="235" actId="1076"/>
+          <ac:picMkLst>
+            <pc:docMk/>
+            <pc:sldMk cId="721809314" sldId="263"/>
+            <ac:picMk id="4" creationId="{4112F0CA-0ABE-4663-98BB-E63202185A4F}"/>
+          </ac:picMkLst>
+        </pc:picChg>
+        <pc:picChg chg="del">
+          <ac:chgData name="David Hardman" userId="25dc0ef6-7b36-4b30-a7ad-8f7f71a3f84a" providerId="ADAL" clId="{62BE712C-E7B9-4F91-9C5E-81F27518FB3F}" dt="2021-10-14T11:48:16.464" v="218" actId="478"/>
+          <ac:picMkLst>
+            <pc:docMk/>
+            <pc:sldMk cId="721809314" sldId="263"/>
+            <ac:picMk id="6" creationId="{CBEB8E37-1724-43FA-884E-AE89F1493DCD}"/>
+          </ac:picMkLst>
+        </pc:picChg>
+        <pc:picChg chg="add mod">
+          <ac:chgData name="David Hardman" userId="25dc0ef6-7b36-4b30-a7ad-8f7f71a3f84a" providerId="ADAL" clId="{62BE712C-E7B9-4F91-9C5E-81F27518FB3F}" dt="2021-10-14T11:49:12.516" v="236" actId="1076"/>
+          <ac:picMkLst>
+            <pc:docMk/>
+            <pc:sldMk cId="721809314" sldId="263"/>
+            <ac:picMk id="7" creationId="{4045406F-9BF4-448D-8FFD-A16E7C7440F9}"/>
+          </ac:picMkLst>
+        </pc:picChg>
+        <pc:picChg chg="add mod">
+          <ac:chgData name="David Hardman" userId="25dc0ef6-7b36-4b30-a7ad-8f7f71a3f84a" providerId="ADAL" clId="{62BE712C-E7B9-4F91-9C5E-81F27518FB3F}" dt="2021-10-14T12:02:14.084" v="250" actId="1076"/>
+          <ac:picMkLst>
+            <pc:docMk/>
+            <pc:sldMk cId="721809314" sldId="263"/>
+            <ac:picMk id="15" creationId="{5DC66980-77EA-4B2D-B7FB-5C6A65EA75D0}"/>
+          </ac:picMkLst>
+        </pc:picChg>
+        <pc:picChg chg="del">
+          <ac:chgData name="David Hardman" userId="25dc0ef6-7b36-4b30-a7ad-8f7f71a3f84a" providerId="ADAL" clId="{62BE712C-E7B9-4F91-9C5E-81F27518FB3F}" dt="2021-10-14T11:45:11.136" v="64" actId="478"/>
+          <ac:picMkLst>
+            <pc:docMk/>
+            <pc:sldMk cId="721809314" sldId="263"/>
+            <ac:picMk id="16" creationId="{83E48870-E4F5-481E-AAC2-1D623278AF61}"/>
+          </ac:picMkLst>
+        </pc:picChg>
+        <pc:picChg chg="del">
+          <ac:chgData name="David Hardman" userId="25dc0ef6-7b36-4b30-a7ad-8f7f71a3f84a" providerId="ADAL" clId="{62BE712C-E7B9-4F91-9C5E-81F27518FB3F}" dt="2021-10-14T11:45:11.632" v="65" actId="478"/>
+          <ac:picMkLst>
+            <pc:docMk/>
+            <pc:sldMk cId="721809314" sldId="263"/>
+            <ac:picMk id="18" creationId="{78EA4596-1BCB-4CED-837E-4F5F4A4AB5BA}"/>
+          </ac:picMkLst>
+        </pc:picChg>
+        <pc:picChg chg="del">
+          <ac:chgData name="David Hardman" userId="25dc0ef6-7b36-4b30-a7ad-8f7f71a3f84a" providerId="ADAL" clId="{62BE712C-E7B9-4F91-9C5E-81F27518FB3F}" dt="2021-10-14T11:48:42.754" v="220" actId="478"/>
+          <ac:picMkLst>
+            <pc:docMk/>
+            <pc:sldMk cId="721809314" sldId="263"/>
+            <ac:picMk id="21" creationId="{75C179E0-D552-46CE-BA8A-3E8E87EF2C2C}"/>
+          </ac:picMkLst>
+        </pc:picChg>
+        <pc:picChg chg="add mod">
+          <ac:chgData name="David Hardman" userId="25dc0ef6-7b36-4b30-a7ad-8f7f71a3f84a" providerId="ADAL" clId="{62BE712C-E7B9-4F91-9C5E-81F27518FB3F}" dt="2021-10-14T12:02:38.159" v="257"/>
+          <ac:picMkLst>
+            <pc:docMk/>
+            <pc:sldMk cId="721809314" sldId="263"/>
+            <ac:picMk id="22" creationId="{85BE9ECB-C322-42DD-A0FF-EA4D9B52A393}"/>
+          </ac:picMkLst>
+        </pc:picChg>
+        <pc:picChg chg="del">
+          <ac:chgData name="David Hardman" userId="25dc0ef6-7b36-4b30-a7ad-8f7f71a3f84a" providerId="ADAL" clId="{62BE712C-E7B9-4F91-9C5E-81F27518FB3F}" dt="2021-10-14T11:48:43.192" v="221" actId="478"/>
+          <ac:picMkLst>
+            <pc:docMk/>
+            <pc:sldMk cId="721809314" sldId="263"/>
+            <ac:picMk id="23" creationId="{F79C8DBC-EBD6-4F7F-8C64-6718F676ECBB}"/>
+          </ac:picMkLst>
+        </pc:picChg>
+        <pc:picChg chg="del">
+          <ac:chgData name="David Hardman" userId="25dc0ef6-7b36-4b30-a7ad-8f7f71a3f84a" providerId="ADAL" clId="{62BE712C-E7B9-4F91-9C5E-81F27518FB3F}" dt="2021-10-14T11:45:15.977" v="69" actId="478"/>
+          <ac:picMkLst>
+            <pc:docMk/>
+            <pc:sldMk cId="721809314" sldId="263"/>
+            <ac:picMk id="26" creationId="{92F7092B-8F91-413A-BDB4-96922969C91A}"/>
+          </ac:picMkLst>
+        </pc:picChg>
+        <pc:picChg chg="del">
+          <ac:chgData name="David Hardman" userId="25dc0ef6-7b36-4b30-a7ad-8f7f71a3f84a" providerId="ADAL" clId="{62BE712C-E7B9-4F91-9C5E-81F27518FB3F}" dt="2021-10-14T11:45:15.527" v="68" actId="478"/>
+          <ac:picMkLst>
+            <pc:docMk/>
+            <pc:sldMk cId="721809314" sldId="263"/>
+            <ac:picMk id="28" creationId="{15059C94-28FF-41EF-A8E5-72E3E7E75448}"/>
+          </ac:picMkLst>
+        </pc:picChg>
+      </pc:sldChg>
+      <pc:sldChg chg="addSp delSp modSp add mod">
+        <pc:chgData name="David Hardman" userId="25dc0ef6-7b36-4b30-a7ad-8f7f71a3f84a" providerId="ADAL" clId="{62BE712C-E7B9-4F91-9C5E-81F27518FB3F}" dt="2021-10-14T12:04:54.221" v="290" actId="20577"/>
+        <pc:sldMkLst>
+          <pc:docMk/>
+          <pc:sldMk cId="4269537502" sldId="264"/>
+        </pc:sldMkLst>
+        <pc:spChg chg="mod">
+          <ac:chgData name="David Hardman" userId="25dc0ef6-7b36-4b30-a7ad-8f7f71a3f84a" providerId="ADAL" clId="{62BE712C-E7B9-4F91-9C5E-81F27518FB3F}" dt="2021-10-14T12:04:41.671" v="286" actId="1076"/>
+          <ac:spMkLst>
+            <pc:docMk/>
+            <pc:sldMk cId="4269537502" sldId="264"/>
+            <ac:spMk id="10" creationId="{27629578-2CE0-4C48-810E-370A6716D34C}"/>
+          </ac:spMkLst>
+        </pc:spChg>
+        <pc:spChg chg="del">
+          <ac:chgData name="David Hardman" userId="25dc0ef6-7b36-4b30-a7ad-8f7f71a3f84a" providerId="ADAL" clId="{62BE712C-E7B9-4F91-9C5E-81F27518FB3F}" dt="2021-10-14T11:46:11.111" v="151" actId="478"/>
+          <ac:spMkLst>
+            <pc:docMk/>
+            <pc:sldMk cId="4269537502" sldId="264"/>
+            <ac:spMk id="11" creationId="{CD6C808D-2C2C-4210-AC64-15B6851B229B}"/>
+          </ac:spMkLst>
+        </pc:spChg>
+        <pc:spChg chg="del">
+          <ac:chgData name="David Hardman" userId="25dc0ef6-7b36-4b30-a7ad-8f7f71a3f84a" providerId="ADAL" clId="{62BE712C-E7B9-4F91-9C5E-81F27518FB3F}" dt="2021-10-14T11:46:12.151" v="153" actId="478"/>
+          <ac:spMkLst>
+            <pc:docMk/>
+            <pc:sldMk cId="4269537502" sldId="264"/>
+            <ac:spMk id="17" creationId="{F901E97F-C1C0-46D3-A479-E85640FD61E4}"/>
+          </ac:spMkLst>
+        </pc:spChg>
+        <pc:spChg chg="add mod">
+          <ac:chgData name="David Hardman" userId="25dc0ef6-7b36-4b30-a7ad-8f7f71a3f84a" providerId="ADAL" clId="{62BE712C-E7B9-4F91-9C5E-81F27518FB3F}" dt="2021-10-14T12:04:54.221" v="290" actId="20577"/>
+          <ac:spMkLst>
+            <pc:docMk/>
+            <pc:sldMk cId="4269537502" sldId="264"/>
+            <ac:spMk id="18" creationId="{C2A7F9DC-1592-4E78-A0CE-D9295B931682}"/>
+          </ac:spMkLst>
+        </pc:spChg>
+        <pc:spChg chg="mod">
+          <ac:chgData name="David Hardman" userId="25dc0ef6-7b36-4b30-a7ad-8f7f71a3f84a" providerId="ADAL" clId="{62BE712C-E7B9-4F91-9C5E-81F27518FB3F}" dt="2021-10-14T11:48:03.524" v="215" actId="20577"/>
+          <ac:spMkLst>
+            <pc:docMk/>
+            <pc:sldMk cId="4269537502" sldId="264"/>
+            <ac:spMk id="22" creationId="{3390089E-54B9-4E7D-B311-2689F158DB1E}"/>
+          </ac:spMkLst>
+        </pc:spChg>
+        <pc:spChg chg="del mod">
+          <ac:chgData name="David Hardman" userId="25dc0ef6-7b36-4b30-a7ad-8f7f71a3f84a" providerId="ADAL" clId="{62BE712C-E7B9-4F91-9C5E-81F27518FB3F}" dt="2021-10-14T11:46:09.320" v="149" actId="478"/>
+          <ac:spMkLst>
+            <pc:docMk/>
+            <pc:sldMk cId="4269537502" sldId="264"/>
+            <ac:spMk id="27" creationId="{834DABDF-0004-4B5C-9ECD-DD8F0D4304F9}"/>
+          </ac:spMkLst>
+        </pc:spChg>
+        <pc:spChg chg="mod">
+          <ac:chgData name="David Hardman" userId="25dc0ef6-7b36-4b30-a7ad-8f7f71a3f84a" providerId="ADAL" clId="{62BE712C-E7B9-4F91-9C5E-81F27518FB3F}" dt="2021-10-14T12:04:49.754" v="289" actId="20577"/>
+          <ac:spMkLst>
+            <pc:docMk/>
+            <pc:sldMk cId="4269537502" sldId="264"/>
+            <ac:spMk id="32" creationId="{DEF14BB6-1050-4462-BCBA-5B6F2E80307C}"/>
+          </ac:spMkLst>
+        </pc:spChg>
+        <pc:picChg chg="add mod">
+          <ac:chgData name="David Hardman" userId="25dc0ef6-7b36-4b30-a7ad-8f7f71a3f84a" providerId="ADAL" clId="{62BE712C-E7B9-4F91-9C5E-81F27518FB3F}" dt="2021-10-14T11:47:27.907" v="204" actId="1076"/>
+          <ac:picMkLst>
+            <pc:docMk/>
+            <pc:sldMk cId="4269537502" sldId="264"/>
+            <ac:picMk id="3" creationId="{F0E756A0-B2B4-4106-B20F-83F6A9E74366}"/>
+          </ac:picMkLst>
+        </pc:picChg>
+        <pc:picChg chg="del">
+          <ac:chgData name="David Hardman" userId="25dc0ef6-7b36-4b30-a7ad-8f7f71a3f84a" providerId="ADAL" clId="{62BE712C-E7B9-4F91-9C5E-81F27518FB3F}" dt="2021-10-14T11:46:12.913" v="154" actId="478"/>
+          <ac:picMkLst>
+            <pc:docMk/>
+            <pc:sldMk cId="4269537502" sldId="264"/>
+            <ac:picMk id="4" creationId="{7414EC11-9399-4026-8A91-E088C326AB1D}"/>
+          </ac:picMkLst>
+        </pc:picChg>
+        <pc:picChg chg="add mod">
+          <ac:chgData name="David Hardman" userId="25dc0ef6-7b36-4b30-a7ad-8f7f71a3f84a" providerId="ADAL" clId="{62BE712C-E7B9-4F91-9C5E-81F27518FB3F}" dt="2021-10-14T11:47:51.900" v="213" actId="1076"/>
+          <ac:picMkLst>
+            <pc:docMk/>
+            <pc:sldMk cId="4269537502" sldId="264"/>
+            <ac:picMk id="6" creationId="{37D2B590-BA08-421D-B41A-918FEF7DE2B4}"/>
+          </ac:picMkLst>
+        </pc:picChg>
+        <pc:picChg chg="del">
+          <ac:chgData name="David Hardman" userId="25dc0ef6-7b36-4b30-a7ad-8f7f71a3f84a" providerId="ADAL" clId="{62BE712C-E7B9-4F91-9C5E-81F27518FB3F}" dt="2021-10-14T11:46:11.617" v="152" actId="478"/>
+          <ac:picMkLst>
+            <pc:docMk/>
+            <pc:sldMk cId="4269537502" sldId="264"/>
+            <ac:picMk id="7" creationId="{B34B333C-9A3D-401D-B253-202CA61F007E}"/>
+          </ac:picMkLst>
+        </pc:picChg>
+        <pc:picChg chg="add mod">
+          <ac:chgData name="David Hardman" userId="25dc0ef6-7b36-4b30-a7ad-8f7f71a3f84a" providerId="ADAL" clId="{62BE712C-E7B9-4F91-9C5E-81F27518FB3F}" dt="2021-10-14T12:04:18.971" v="279" actId="14100"/>
+          <ac:picMkLst>
+            <pc:docMk/>
+            <pc:sldMk cId="4269537502" sldId="264"/>
+            <ac:picMk id="13" creationId="{5ABB3B75-61B1-4AFC-BF3D-6CF0978444B7}"/>
+          </ac:picMkLst>
+        </pc:picChg>
+        <pc:picChg chg="del">
+          <ac:chgData name="David Hardman" userId="25dc0ef6-7b36-4b30-a7ad-8f7f71a3f84a" providerId="ADAL" clId="{62BE712C-E7B9-4F91-9C5E-81F27518FB3F}" dt="2021-10-14T11:47:15.983" v="197" actId="478"/>
+          <ac:picMkLst>
+            <pc:docMk/>
+            <pc:sldMk cId="4269537502" sldId="264"/>
+            <ac:picMk id="15" creationId="{FA569B9A-F3AF-44E2-A72D-28A5C41547E9}"/>
+          </ac:picMkLst>
+        </pc:picChg>
+        <pc:picChg chg="add mod">
+          <ac:chgData name="David Hardman" userId="25dc0ef6-7b36-4b30-a7ad-8f7f71a3f84a" providerId="ADAL" clId="{62BE712C-E7B9-4F91-9C5E-81F27518FB3F}" dt="2021-10-14T12:04:39.176" v="285" actId="1076"/>
+          <ac:picMkLst>
+            <pc:docMk/>
+            <pc:sldMk cId="4269537502" sldId="264"/>
+            <ac:picMk id="16" creationId="{9B0262B8-0755-46E4-8529-4744807760F9}"/>
+          </ac:picMkLst>
+        </pc:picChg>
+        <pc:picChg chg="del">
+          <ac:chgData name="David Hardman" userId="25dc0ef6-7b36-4b30-a7ad-8f7f71a3f84a" providerId="ADAL" clId="{62BE712C-E7B9-4F91-9C5E-81F27518FB3F}" dt="2021-10-14T11:47:16.639" v="198" actId="478"/>
+          <ac:picMkLst>
+            <pc:docMk/>
+            <pc:sldMk cId="4269537502" sldId="264"/>
+            <ac:picMk id="21" creationId="{34FB0A96-7978-4893-83D5-259F3C960579}"/>
+          </ac:picMkLst>
+        </pc:picChg>
+        <pc:picChg chg="del">
+          <ac:chgData name="David Hardman" userId="25dc0ef6-7b36-4b30-a7ad-8f7f71a3f84a" providerId="ADAL" clId="{62BE712C-E7B9-4F91-9C5E-81F27518FB3F}" dt="2021-10-14T11:46:09.648" v="150" actId="478"/>
+          <ac:picMkLst>
+            <pc:docMk/>
+            <pc:sldMk cId="4269537502" sldId="264"/>
+            <ac:picMk id="24" creationId="{1772FFDB-3DF0-4F6E-98EB-F945EA6D7636}"/>
+          </ac:picMkLst>
+        </pc:picChg>
+        <pc:picChg chg="del">
+          <ac:chgData name="David Hardman" userId="25dc0ef6-7b36-4b30-a7ad-8f7f71a3f84a" providerId="ADAL" clId="{62BE712C-E7B9-4F91-9C5E-81F27518FB3F}" dt="2021-10-14T11:46:08.057" v="147" actId="478"/>
+          <ac:picMkLst>
+            <pc:docMk/>
+            <pc:sldMk cId="4269537502" sldId="264"/>
+            <ac:picMk id="26" creationId="{C79D1C30-CC48-4472-8DEF-FFDE8E54CF21}"/>
+          </ac:picMkLst>
+        </pc:picChg>
+        <pc:picChg chg="del">
+          <ac:chgData name="David Hardman" userId="25dc0ef6-7b36-4b30-a7ad-8f7f71a3f84a" providerId="ADAL" clId="{62BE712C-E7B9-4F91-9C5E-81F27518FB3F}" dt="2021-10-14T11:48:10.504" v="216" actId="478"/>
+          <ac:picMkLst>
+            <pc:docMk/>
+            <pc:sldMk cId="4269537502" sldId="264"/>
+            <ac:picMk id="29" creationId="{454448E2-7CCA-4635-8D0D-0B599663375B}"/>
+          </ac:picMkLst>
+        </pc:picChg>
+        <pc:picChg chg="del">
+          <ac:chgData name="David Hardman" userId="25dc0ef6-7b36-4b30-a7ad-8f7f71a3f84a" providerId="ADAL" clId="{62BE712C-E7B9-4F91-9C5E-81F27518FB3F}" dt="2021-10-14T11:48:10.960" v="217" actId="478"/>
+          <ac:picMkLst>
+            <pc:docMk/>
+            <pc:sldMk cId="4269537502" sldId="264"/>
             <ac:picMk id="31" creationId="{1ED34797-1D19-4C54-8693-EB1F168B5C56}"/>
           </ac:picMkLst>
         </pc:picChg>
@@ -5535,6 +5898,883 @@
 </p:sld>
 </file>
 
+<file path=ppt/slides/slide5.xml><?xml version="1.0" encoding="utf-8"?>
+<p:sld xmlns:a="http://schemas.openxmlformats.org/drawingml/2006/main" xmlns:r="http://schemas.openxmlformats.org/officeDocument/2006/relationships" xmlns:p="http://schemas.openxmlformats.org/presentationml/2006/main">
+  <p:cSld>
+    <p:spTree>
+      <p:nvGrpSpPr>
+        <p:cNvPr id="1" name=""/>
+        <p:cNvGrpSpPr/>
+        <p:nvPr/>
+      </p:nvGrpSpPr>
+      <p:grpSpPr>
+        <a:xfrm>
+          <a:off x="0" y="0"/>
+          <a:ext cx="0" cy="0"/>
+          <a:chOff x="0" y="0"/>
+          <a:chExt cx="0" cy="0"/>
+        </a:xfrm>
+      </p:grpSpPr>
+      <p:sp>
+        <p:nvSpPr>
+          <p:cNvPr id="8" name="TextBox 7">
+            <a:extLst>
+              <a:ext uri="{FF2B5EF4-FFF2-40B4-BE49-F238E27FC236}">
+                <a16:creationId xmlns:a16="http://schemas.microsoft.com/office/drawing/2014/main" id="{31ED1360-9A6B-44B8-963B-F1961CAFCA3E}"/>
+              </a:ext>
+            </a:extLst>
+          </p:cNvPr>
+          <p:cNvSpPr txBox="1"/>
+          <p:nvPr/>
+        </p:nvSpPr>
+        <p:spPr>
+          <a:xfrm>
+            <a:off x="4238000" y="162091"/>
+            <a:ext cx="2775358" cy="646331"/>
+          </a:xfrm>
+          <a:prstGeom prst="rect">
+            <a:avLst/>
+          </a:prstGeom>
+          <a:noFill/>
+        </p:spPr>
+        <p:txBody>
+          <a:bodyPr wrap="square" rtlCol="0">
+            <a:spAutoFit/>
+          </a:bodyPr>
+          <a:lstStyle/>
+          <a:p>
+            <a:pPr algn="ctr"/>
+            <a:r>
+              <a:rPr lang="en-GB" b="1" dirty="0"/>
+              <a:t>Trained on B</a:t>
+            </a:r>
+          </a:p>
+          <a:p>
+            <a:pPr algn="ctr"/>
+            <a:r>
+              <a:rPr lang="en-GB" b="1" dirty="0"/>
+              <a:t>Tested on B</a:t>
+            </a:r>
+          </a:p>
+        </p:txBody>
+      </p:sp>
+      <p:sp>
+        <p:nvSpPr>
+          <p:cNvPr id="9" name="TextBox 8">
+            <a:extLst>
+              <a:ext uri="{FF2B5EF4-FFF2-40B4-BE49-F238E27FC236}">
+                <a16:creationId xmlns:a16="http://schemas.microsoft.com/office/drawing/2014/main" id="{BFF926B6-2969-4B66-8B55-558984189064}"/>
+              </a:ext>
+            </a:extLst>
+          </p:cNvPr>
+          <p:cNvSpPr txBox="1"/>
+          <p:nvPr/>
+        </p:nvSpPr>
+        <p:spPr>
+          <a:xfrm>
+            <a:off x="3898786" y="6261239"/>
+            <a:ext cx="3570912" cy="369332"/>
+          </a:xfrm>
+          <a:prstGeom prst="rect">
+            <a:avLst/>
+          </a:prstGeom>
+          <a:noFill/>
+        </p:spPr>
+        <p:txBody>
+          <a:bodyPr wrap="square" rtlCol="0">
+            <a:spAutoFit/>
+          </a:bodyPr>
+          <a:lstStyle/>
+          <a:p>
+            <a:pPr algn="ctr"/>
+            <a:r>
+              <a:rPr lang="en-GB" u="sng" dirty="0"/>
+              <a:t>Potential for overfitting to noise</a:t>
+            </a:r>
+          </a:p>
+        </p:txBody>
+      </p:sp>
+      <p:sp>
+        <p:nvSpPr>
+          <p:cNvPr id="10" name="TextBox 9">
+            <a:extLst>
+              <a:ext uri="{FF2B5EF4-FFF2-40B4-BE49-F238E27FC236}">
+                <a16:creationId xmlns:a16="http://schemas.microsoft.com/office/drawing/2014/main" id="{27629578-2CE0-4C48-810E-370A6716D34C}"/>
+              </a:ext>
+            </a:extLst>
+          </p:cNvPr>
+          <p:cNvSpPr txBox="1"/>
+          <p:nvPr/>
+        </p:nvSpPr>
+        <p:spPr>
+          <a:xfrm>
+            <a:off x="815870" y="428895"/>
+            <a:ext cx="2775358" cy="369332"/>
+          </a:xfrm>
+          <a:prstGeom prst="rect">
+            <a:avLst/>
+          </a:prstGeom>
+          <a:noFill/>
+        </p:spPr>
+        <p:txBody>
+          <a:bodyPr wrap="square" rtlCol="0">
+            <a:spAutoFit/>
+          </a:bodyPr>
+          <a:lstStyle/>
+          <a:p>
+            <a:pPr algn="ctr"/>
+            <a:r>
+              <a:rPr lang="en-GB" dirty="0"/>
+              <a:t>N=100</a:t>
+            </a:r>
+          </a:p>
+        </p:txBody>
+      </p:sp>
+      <p:sp>
+        <p:nvSpPr>
+          <p:cNvPr id="12" name="TextBox 11">
+            <a:extLst>
+              <a:ext uri="{FF2B5EF4-FFF2-40B4-BE49-F238E27FC236}">
+                <a16:creationId xmlns:a16="http://schemas.microsoft.com/office/drawing/2014/main" id="{84995CB9-CE84-40D2-87EB-F954829CA6B4}"/>
+              </a:ext>
+            </a:extLst>
+          </p:cNvPr>
+          <p:cNvSpPr txBox="1"/>
+          <p:nvPr/>
+        </p:nvSpPr>
+        <p:spPr>
+          <a:xfrm>
+            <a:off x="4296563" y="3439449"/>
+            <a:ext cx="2775358" cy="646331"/>
+          </a:xfrm>
+          <a:prstGeom prst="rect">
+            <a:avLst/>
+          </a:prstGeom>
+          <a:noFill/>
+        </p:spPr>
+        <p:txBody>
+          <a:bodyPr wrap="square" rtlCol="0">
+            <a:spAutoFit/>
+          </a:bodyPr>
+          <a:lstStyle/>
+          <a:p>
+            <a:pPr algn="ctr"/>
+            <a:r>
+              <a:rPr lang="en-GB" b="1" dirty="0"/>
+              <a:t>Trained on C</a:t>
+            </a:r>
+          </a:p>
+          <a:p>
+            <a:pPr algn="ctr"/>
+            <a:r>
+              <a:rPr lang="en-GB" b="1" dirty="0"/>
+              <a:t>Tested on C</a:t>
+            </a:r>
+          </a:p>
+        </p:txBody>
+      </p:sp>
+      <p:sp>
+        <p:nvSpPr>
+          <p:cNvPr id="24" name="TextBox 23">
+            <a:extLst>
+              <a:ext uri="{FF2B5EF4-FFF2-40B4-BE49-F238E27FC236}">
+                <a16:creationId xmlns:a16="http://schemas.microsoft.com/office/drawing/2014/main" id="{C61BE213-D958-495D-B5A5-5FF3B61FFDF2}"/>
+              </a:ext>
+            </a:extLst>
+          </p:cNvPr>
+          <p:cNvSpPr txBox="1"/>
+          <p:nvPr/>
+        </p:nvSpPr>
+        <p:spPr>
+          <a:xfrm>
+            <a:off x="3123853" y="5827570"/>
+            <a:ext cx="1549866" cy="369332"/>
+          </a:xfrm>
+          <a:prstGeom prst="rect">
+            <a:avLst/>
+          </a:prstGeom>
+          <a:noFill/>
+        </p:spPr>
+        <p:txBody>
+          <a:bodyPr wrap="square">
+            <a:spAutoFit/>
+          </a:bodyPr>
+          <a:lstStyle/>
+          <a:p>
+            <a:r>
+              <a:rPr lang="en-GB" dirty="0"/>
+              <a:t>3.25mm mean</a:t>
+            </a:r>
+          </a:p>
+        </p:txBody>
+      </p:sp>
+      <p:sp>
+        <p:nvSpPr>
+          <p:cNvPr id="20" name="TextBox 19">
+            <a:extLst>
+              <a:ext uri="{FF2B5EF4-FFF2-40B4-BE49-F238E27FC236}">
+                <a16:creationId xmlns:a16="http://schemas.microsoft.com/office/drawing/2014/main" id="{6A2F3CC1-2EE2-41B0-9667-CA53918A4C27}"/>
+              </a:ext>
+            </a:extLst>
+          </p:cNvPr>
+          <p:cNvSpPr txBox="1"/>
+          <p:nvPr/>
+        </p:nvSpPr>
+        <p:spPr>
+          <a:xfrm>
+            <a:off x="7792676" y="2693819"/>
+            <a:ext cx="3570912" cy="646331"/>
+          </a:xfrm>
+          <a:prstGeom prst="rect">
+            <a:avLst/>
+          </a:prstGeom>
+          <a:noFill/>
+        </p:spPr>
+        <p:txBody>
+          <a:bodyPr wrap="square" rtlCol="0">
+            <a:spAutoFit/>
+          </a:bodyPr>
+          <a:lstStyle/>
+          <a:p>
+            <a:pPr algn="ctr"/>
+            <a:r>
+              <a:rPr lang="en-GB" b="1" u="sng" dirty="0">
+                <a:solidFill>
+                  <a:srgbClr val="FF0000"/>
+                </a:solidFill>
+              </a:rPr>
+              <a:t>These 2 slides use 80 points from the raw data without TVD</a:t>
+            </a:r>
+          </a:p>
+        </p:txBody>
+      </p:sp>
+      <p:pic>
+        <p:nvPicPr>
+          <p:cNvPr id="4" name="Picture 3">
+            <a:extLst>
+              <a:ext uri="{FF2B5EF4-FFF2-40B4-BE49-F238E27FC236}">
+                <a16:creationId xmlns:a16="http://schemas.microsoft.com/office/drawing/2014/main" id="{4112F0CA-0ABE-4663-98BB-E63202185A4F}"/>
+              </a:ext>
+            </a:extLst>
+          </p:cNvPr>
+          <p:cNvPicPr>
+            <a:picLocks noChangeAspect="1"/>
+          </p:cNvPicPr>
+          <p:nvPr/>
+        </p:nvPicPr>
+        <p:blipFill>
+          <a:blip r:embed="rId2">
+            <a:clrChange>
+              <a:clrFrom>
+                <a:srgbClr val="F0F0F0"/>
+              </a:clrFrom>
+              <a:clrTo>
+                <a:srgbClr val="F0F0F0">
+                  <a:alpha val="0"/>
+                </a:srgbClr>
+              </a:clrTo>
+            </a:clrChange>
+          </a:blip>
+          <a:stretch>
+            <a:fillRect/>
+          </a:stretch>
+        </p:blipFill>
+        <p:spPr>
+          <a:xfrm>
+            <a:off x="5231397" y="4124103"/>
+            <a:ext cx="3242372" cy="1804135"/>
+          </a:xfrm>
+          <a:prstGeom prst="rect">
+            <a:avLst/>
+          </a:prstGeom>
+        </p:spPr>
+      </p:pic>
+      <p:pic>
+        <p:nvPicPr>
+          <p:cNvPr id="7" name="Picture 6">
+            <a:extLst>
+              <a:ext uri="{FF2B5EF4-FFF2-40B4-BE49-F238E27FC236}">
+                <a16:creationId xmlns:a16="http://schemas.microsoft.com/office/drawing/2014/main" id="{4045406F-9BF4-448D-8FFD-A16E7C7440F9}"/>
+              </a:ext>
+            </a:extLst>
+          </p:cNvPr>
+          <p:cNvPicPr>
+            <a:picLocks noChangeAspect="1"/>
+          </p:cNvPicPr>
+          <p:nvPr/>
+        </p:nvPicPr>
+        <p:blipFill>
+          <a:blip r:embed="rId3">
+            <a:clrChange>
+              <a:clrFrom>
+                <a:srgbClr val="F0F0F0"/>
+              </a:clrFrom>
+              <a:clrTo>
+                <a:srgbClr val="F0F0F0">
+                  <a:alpha val="0"/>
+                </a:srgbClr>
+              </a:clrTo>
+            </a:clrChange>
+          </a:blip>
+          <a:stretch>
+            <a:fillRect/>
+          </a:stretch>
+        </p:blipFill>
+        <p:spPr>
+          <a:xfrm>
+            <a:off x="2920787" y="4085780"/>
+            <a:ext cx="1955998" cy="1843896"/>
+          </a:xfrm>
+          <a:prstGeom prst="rect">
+            <a:avLst/>
+          </a:prstGeom>
+        </p:spPr>
+      </p:pic>
+      <p:pic>
+        <p:nvPicPr>
+          <p:cNvPr id="15" name="Picture 14">
+            <a:extLst>
+              <a:ext uri="{FF2B5EF4-FFF2-40B4-BE49-F238E27FC236}">
+                <a16:creationId xmlns:a16="http://schemas.microsoft.com/office/drawing/2014/main" id="{5DC66980-77EA-4B2D-B7FB-5C6A65EA75D0}"/>
+              </a:ext>
+            </a:extLst>
+          </p:cNvPr>
+          <p:cNvPicPr>
+            <a:picLocks noChangeAspect="1"/>
+          </p:cNvPicPr>
+          <p:nvPr/>
+        </p:nvPicPr>
+        <p:blipFill>
+          <a:blip r:embed="rId4">
+            <a:clrChange>
+              <a:clrFrom>
+                <a:srgbClr val="F0F0F0"/>
+              </a:clrFrom>
+              <a:clrTo>
+                <a:srgbClr val="F0F0F0">
+                  <a:alpha val="0"/>
+                </a:srgbClr>
+              </a:clrTo>
+            </a:clrChange>
+          </a:blip>
+          <a:stretch>
+            <a:fillRect/>
+          </a:stretch>
+        </p:blipFill>
+        <p:spPr>
+          <a:xfrm>
+            <a:off x="5086862" y="746436"/>
+            <a:ext cx="3329052" cy="1806462"/>
+          </a:xfrm>
+          <a:prstGeom prst="rect">
+            <a:avLst/>
+          </a:prstGeom>
+        </p:spPr>
+      </p:pic>
+      <p:pic>
+        <p:nvPicPr>
+          <p:cNvPr id="22" name="Picture 21">
+            <a:extLst>
+              <a:ext uri="{FF2B5EF4-FFF2-40B4-BE49-F238E27FC236}">
+                <a16:creationId xmlns:a16="http://schemas.microsoft.com/office/drawing/2014/main" id="{85BE9ECB-C322-42DD-A0FF-EA4D9B52A393}"/>
+              </a:ext>
+            </a:extLst>
+          </p:cNvPr>
+          <p:cNvPicPr>
+            <a:picLocks noChangeAspect="1"/>
+          </p:cNvPicPr>
+          <p:nvPr/>
+        </p:nvPicPr>
+        <p:blipFill>
+          <a:blip r:embed="rId5">
+            <a:clrChange>
+              <a:clrFrom>
+                <a:srgbClr val="F0F0F0"/>
+              </a:clrFrom>
+              <a:clrTo>
+                <a:srgbClr val="F0F0F0">
+                  <a:alpha val="0"/>
+                </a:srgbClr>
+              </a:clrTo>
+            </a:clrChange>
+          </a:blip>
+          <a:stretch>
+            <a:fillRect/>
+          </a:stretch>
+        </p:blipFill>
+        <p:spPr>
+          <a:xfrm>
+            <a:off x="2936854" y="745267"/>
+            <a:ext cx="1923863" cy="1806462"/>
+          </a:xfrm>
+          <a:prstGeom prst="rect">
+            <a:avLst/>
+          </a:prstGeom>
+        </p:spPr>
+      </p:pic>
+      <p:sp>
+        <p:nvSpPr>
+          <p:cNvPr id="30" name="TextBox 29">
+            <a:extLst>
+              <a:ext uri="{FF2B5EF4-FFF2-40B4-BE49-F238E27FC236}">
+                <a16:creationId xmlns:a16="http://schemas.microsoft.com/office/drawing/2014/main" id="{A7F5ED5F-31A1-4276-AE36-AADEA80FEB11}"/>
+              </a:ext>
+            </a:extLst>
+          </p:cNvPr>
+          <p:cNvSpPr txBox="1"/>
+          <p:nvPr/>
+        </p:nvSpPr>
+        <p:spPr>
+          <a:xfrm>
+            <a:off x="3032150" y="2487758"/>
+            <a:ext cx="1549866" cy="369332"/>
+          </a:xfrm>
+          <a:prstGeom prst="rect">
+            <a:avLst/>
+          </a:prstGeom>
+          <a:noFill/>
+        </p:spPr>
+        <p:txBody>
+          <a:bodyPr wrap="square">
+            <a:spAutoFit/>
+          </a:bodyPr>
+          <a:lstStyle/>
+          <a:p>
+            <a:r>
+              <a:rPr lang="en-GB" dirty="0"/>
+              <a:t>4.11mm mean</a:t>
+            </a:r>
+          </a:p>
+        </p:txBody>
+      </p:sp>
+    </p:spTree>
+    <p:extLst>
+      <p:ext uri="{BB962C8B-B14F-4D97-AF65-F5344CB8AC3E}">
+        <p14:creationId xmlns:p14="http://schemas.microsoft.com/office/powerpoint/2010/main" val="721809314"/>
+      </p:ext>
+    </p:extLst>
+  </p:cSld>
+  <p:clrMapOvr>
+    <a:masterClrMapping/>
+  </p:clrMapOvr>
+</p:sld>
+</file>
+
+<file path=ppt/slides/slide6.xml><?xml version="1.0" encoding="utf-8"?>
+<p:sld xmlns:a="http://schemas.openxmlformats.org/drawingml/2006/main" xmlns:r="http://schemas.openxmlformats.org/officeDocument/2006/relationships" xmlns:p="http://schemas.openxmlformats.org/presentationml/2006/main">
+  <p:cSld>
+    <p:spTree>
+      <p:nvGrpSpPr>
+        <p:cNvPr id="1" name=""/>
+        <p:cNvGrpSpPr/>
+        <p:nvPr/>
+      </p:nvGrpSpPr>
+      <p:grpSpPr>
+        <a:xfrm>
+          <a:off x="0" y="0"/>
+          <a:ext cx="0" cy="0"/>
+          <a:chOff x="0" y="0"/>
+          <a:chExt cx="0" cy="0"/>
+        </a:xfrm>
+      </p:grpSpPr>
+      <p:sp>
+        <p:nvSpPr>
+          <p:cNvPr id="8" name="TextBox 7">
+            <a:extLst>
+              <a:ext uri="{FF2B5EF4-FFF2-40B4-BE49-F238E27FC236}">
+                <a16:creationId xmlns:a16="http://schemas.microsoft.com/office/drawing/2014/main" id="{31ED1360-9A6B-44B8-963B-F1961CAFCA3E}"/>
+              </a:ext>
+            </a:extLst>
+          </p:cNvPr>
+          <p:cNvSpPr txBox="1"/>
+          <p:nvPr/>
+        </p:nvSpPr>
+        <p:spPr>
+          <a:xfrm>
+            <a:off x="4238000" y="162091"/>
+            <a:ext cx="2775358" cy="646331"/>
+          </a:xfrm>
+          <a:prstGeom prst="rect">
+            <a:avLst/>
+          </a:prstGeom>
+          <a:noFill/>
+        </p:spPr>
+        <p:txBody>
+          <a:bodyPr wrap="square" rtlCol="0">
+            <a:spAutoFit/>
+          </a:bodyPr>
+          <a:lstStyle/>
+          <a:p>
+            <a:pPr algn="ctr"/>
+            <a:r>
+              <a:rPr lang="en-GB" b="1" dirty="0"/>
+              <a:t>Trained on B</a:t>
+            </a:r>
+          </a:p>
+          <a:p>
+            <a:pPr algn="ctr"/>
+            <a:r>
+              <a:rPr lang="en-GB" b="1" dirty="0"/>
+              <a:t>Tested on C</a:t>
+            </a:r>
+          </a:p>
+        </p:txBody>
+      </p:sp>
+      <p:sp>
+        <p:nvSpPr>
+          <p:cNvPr id="10" name="TextBox 9">
+            <a:extLst>
+              <a:ext uri="{FF2B5EF4-FFF2-40B4-BE49-F238E27FC236}">
+                <a16:creationId xmlns:a16="http://schemas.microsoft.com/office/drawing/2014/main" id="{27629578-2CE0-4C48-810E-370A6716D34C}"/>
+              </a:ext>
+            </a:extLst>
+          </p:cNvPr>
+          <p:cNvSpPr txBox="1"/>
+          <p:nvPr/>
+        </p:nvSpPr>
+        <p:spPr>
+          <a:xfrm>
+            <a:off x="1840770" y="300590"/>
+            <a:ext cx="2775358" cy="369332"/>
+          </a:xfrm>
+          <a:prstGeom prst="rect">
+            <a:avLst/>
+          </a:prstGeom>
+          <a:noFill/>
+        </p:spPr>
+        <p:txBody>
+          <a:bodyPr wrap="square" rtlCol="0">
+            <a:spAutoFit/>
+          </a:bodyPr>
+          <a:lstStyle/>
+          <a:p>
+            <a:pPr algn="ctr"/>
+            <a:r>
+              <a:rPr lang="en-GB" dirty="0"/>
+              <a:t>N=100</a:t>
+            </a:r>
+          </a:p>
+        </p:txBody>
+      </p:sp>
+      <p:sp>
+        <p:nvSpPr>
+          <p:cNvPr id="12" name="TextBox 11">
+            <a:extLst>
+              <a:ext uri="{FF2B5EF4-FFF2-40B4-BE49-F238E27FC236}">
+                <a16:creationId xmlns:a16="http://schemas.microsoft.com/office/drawing/2014/main" id="{84995CB9-CE84-40D2-87EB-F954829CA6B4}"/>
+              </a:ext>
+            </a:extLst>
+          </p:cNvPr>
+          <p:cNvSpPr txBox="1"/>
+          <p:nvPr/>
+        </p:nvSpPr>
+        <p:spPr>
+          <a:xfrm>
+            <a:off x="4296563" y="3105834"/>
+            <a:ext cx="2775358" cy="646331"/>
+          </a:xfrm>
+          <a:prstGeom prst="rect">
+            <a:avLst/>
+          </a:prstGeom>
+          <a:noFill/>
+        </p:spPr>
+        <p:txBody>
+          <a:bodyPr wrap="square" rtlCol="0">
+            <a:spAutoFit/>
+          </a:bodyPr>
+          <a:lstStyle/>
+          <a:p>
+            <a:pPr algn="ctr"/>
+            <a:r>
+              <a:rPr lang="en-GB" b="1" dirty="0"/>
+              <a:t>Trained on C</a:t>
+            </a:r>
+          </a:p>
+          <a:p>
+            <a:pPr algn="ctr"/>
+            <a:r>
+              <a:rPr lang="en-GB" b="1" dirty="0"/>
+              <a:t>Tested on B</a:t>
+            </a:r>
+          </a:p>
+        </p:txBody>
+      </p:sp>
+      <p:sp>
+        <p:nvSpPr>
+          <p:cNvPr id="22" name="TextBox 21">
+            <a:extLst>
+              <a:ext uri="{FF2B5EF4-FFF2-40B4-BE49-F238E27FC236}">
+                <a16:creationId xmlns:a16="http://schemas.microsoft.com/office/drawing/2014/main" id="{3390089E-54B9-4E7D-B311-2689F158DB1E}"/>
+              </a:ext>
+            </a:extLst>
+          </p:cNvPr>
+          <p:cNvSpPr txBox="1"/>
+          <p:nvPr/>
+        </p:nvSpPr>
+        <p:spPr>
+          <a:xfrm>
+            <a:off x="2608344" y="5893810"/>
+            <a:ext cx="1549866" cy="369332"/>
+          </a:xfrm>
+          <a:prstGeom prst="rect">
+            <a:avLst/>
+          </a:prstGeom>
+          <a:noFill/>
+        </p:spPr>
+        <p:txBody>
+          <a:bodyPr wrap="square">
+            <a:spAutoFit/>
+          </a:bodyPr>
+          <a:lstStyle/>
+          <a:p>
+            <a:r>
+              <a:rPr lang="en-GB" dirty="0"/>
+              <a:t>4.40mm mean</a:t>
+            </a:r>
+          </a:p>
+        </p:txBody>
+      </p:sp>
+      <p:sp>
+        <p:nvSpPr>
+          <p:cNvPr id="32" name="TextBox 31">
+            <a:extLst>
+              <a:ext uri="{FF2B5EF4-FFF2-40B4-BE49-F238E27FC236}">
+                <a16:creationId xmlns:a16="http://schemas.microsoft.com/office/drawing/2014/main" id="{DEF14BB6-1050-4462-BCBA-5B6F2E80307C}"/>
+              </a:ext>
+            </a:extLst>
+          </p:cNvPr>
+          <p:cNvSpPr txBox="1"/>
+          <p:nvPr/>
+        </p:nvSpPr>
+        <p:spPr>
+          <a:xfrm>
+            <a:off x="2579057" y="2880632"/>
+            <a:ext cx="1549866" cy="369332"/>
+          </a:xfrm>
+          <a:prstGeom prst="rect">
+            <a:avLst/>
+          </a:prstGeom>
+          <a:noFill/>
+        </p:spPr>
+        <p:txBody>
+          <a:bodyPr wrap="square">
+            <a:spAutoFit/>
+          </a:bodyPr>
+          <a:lstStyle/>
+          <a:p>
+            <a:r>
+              <a:rPr lang="en-GB" dirty="0"/>
+              <a:t>5.42mm mean</a:t>
+            </a:r>
+          </a:p>
+        </p:txBody>
+      </p:sp>
+      <p:sp>
+        <p:nvSpPr>
+          <p:cNvPr id="18" name="TextBox 17">
+            <a:extLst>
+              <a:ext uri="{FF2B5EF4-FFF2-40B4-BE49-F238E27FC236}">
+                <a16:creationId xmlns:a16="http://schemas.microsoft.com/office/drawing/2014/main" id="{C2A7F9DC-1592-4E78-A0CE-D9295B931682}"/>
+              </a:ext>
+            </a:extLst>
+          </p:cNvPr>
+          <p:cNvSpPr txBox="1"/>
+          <p:nvPr/>
+        </p:nvSpPr>
+        <p:spPr>
+          <a:xfrm>
+            <a:off x="8363127" y="2649800"/>
+            <a:ext cx="3570912" cy="646331"/>
+          </a:xfrm>
+          <a:prstGeom prst="rect">
+            <a:avLst/>
+          </a:prstGeom>
+          <a:noFill/>
+        </p:spPr>
+        <p:txBody>
+          <a:bodyPr wrap="square" rtlCol="0">
+            <a:spAutoFit/>
+          </a:bodyPr>
+          <a:lstStyle/>
+          <a:p>
+            <a:pPr algn="ctr"/>
+            <a:r>
+              <a:rPr lang="en-GB" b="1" u="sng" dirty="0">
+                <a:solidFill>
+                  <a:srgbClr val="FF0000"/>
+                </a:solidFill>
+              </a:rPr>
+              <a:t>These 2 slides use 80 points from the raw data without TVD</a:t>
+            </a:r>
+          </a:p>
+        </p:txBody>
+      </p:sp>
+      <p:pic>
+        <p:nvPicPr>
+          <p:cNvPr id="3" name="Picture 2">
+            <a:extLst>
+              <a:ext uri="{FF2B5EF4-FFF2-40B4-BE49-F238E27FC236}">
+                <a16:creationId xmlns:a16="http://schemas.microsoft.com/office/drawing/2014/main" id="{F0E756A0-B2B4-4106-B20F-83F6A9E74366}"/>
+              </a:ext>
+            </a:extLst>
+          </p:cNvPr>
+          <p:cNvPicPr>
+            <a:picLocks noChangeAspect="1"/>
+          </p:cNvPicPr>
+          <p:nvPr/>
+        </p:nvPicPr>
+        <p:blipFill>
+          <a:blip r:embed="rId2">
+            <a:clrChange>
+              <a:clrFrom>
+                <a:srgbClr val="F0F0F0"/>
+              </a:clrFrom>
+              <a:clrTo>
+                <a:srgbClr val="F0F0F0">
+                  <a:alpha val="0"/>
+                </a:srgbClr>
+              </a:clrTo>
+            </a:clrChange>
+          </a:blip>
+          <a:stretch>
+            <a:fillRect/>
+          </a:stretch>
+        </p:blipFill>
+        <p:spPr>
+          <a:xfrm>
+            <a:off x="4841217" y="3785926"/>
+            <a:ext cx="3748095" cy="2089645"/>
+          </a:xfrm>
+          <a:prstGeom prst="rect">
+            <a:avLst/>
+          </a:prstGeom>
+        </p:spPr>
+      </p:pic>
+      <p:pic>
+        <p:nvPicPr>
+          <p:cNvPr id="6" name="Picture 5">
+            <a:extLst>
+              <a:ext uri="{FF2B5EF4-FFF2-40B4-BE49-F238E27FC236}">
+                <a16:creationId xmlns:a16="http://schemas.microsoft.com/office/drawing/2014/main" id="{37D2B590-BA08-421D-B41A-918FEF7DE2B4}"/>
+              </a:ext>
+            </a:extLst>
+          </p:cNvPr>
+          <p:cNvPicPr>
+            <a:picLocks noChangeAspect="1"/>
+          </p:cNvPicPr>
+          <p:nvPr/>
+        </p:nvPicPr>
+        <p:blipFill>
+          <a:blip r:embed="rId3">
+            <a:clrChange>
+              <a:clrFrom>
+                <a:srgbClr val="F0F0F0"/>
+              </a:clrFrom>
+              <a:clrTo>
+                <a:srgbClr val="F0F0F0">
+                  <a:alpha val="0"/>
+                </a:srgbClr>
+              </a:clrTo>
+            </a:clrChange>
+          </a:blip>
+          <a:stretch>
+            <a:fillRect/>
+          </a:stretch>
+        </p:blipFill>
+        <p:spPr>
+          <a:xfrm>
+            <a:off x="2203549" y="3681819"/>
+            <a:ext cx="2359457" cy="2211991"/>
+          </a:xfrm>
+          <a:prstGeom prst="rect">
+            <a:avLst/>
+          </a:prstGeom>
+        </p:spPr>
+      </p:pic>
+      <p:pic>
+        <p:nvPicPr>
+          <p:cNvPr id="13" name="Picture 12">
+            <a:extLst>
+              <a:ext uri="{FF2B5EF4-FFF2-40B4-BE49-F238E27FC236}">
+                <a16:creationId xmlns:a16="http://schemas.microsoft.com/office/drawing/2014/main" id="{5ABB3B75-61B1-4AFC-BF3D-6CF0978444B7}"/>
+              </a:ext>
+            </a:extLst>
+          </p:cNvPr>
+          <p:cNvPicPr>
+            <a:picLocks noChangeAspect="1"/>
+          </p:cNvPicPr>
+          <p:nvPr/>
+        </p:nvPicPr>
+        <p:blipFill>
+          <a:blip r:embed="rId4">
+            <a:clrChange>
+              <a:clrFrom>
+                <a:srgbClr val="F0F0F0"/>
+              </a:clrFrom>
+              <a:clrTo>
+                <a:srgbClr val="F0F0F0">
+                  <a:alpha val="0"/>
+                </a:srgbClr>
+              </a:clrTo>
+            </a:clrChange>
+          </a:blip>
+          <a:stretch>
+            <a:fillRect/>
+          </a:stretch>
+        </p:blipFill>
+        <p:spPr>
+          <a:xfrm>
+            <a:off x="4841217" y="715661"/>
+            <a:ext cx="3748095" cy="2053923"/>
+          </a:xfrm>
+          <a:prstGeom prst="rect">
+            <a:avLst/>
+          </a:prstGeom>
+        </p:spPr>
+      </p:pic>
+      <p:pic>
+        <p:nvPicPr>
+          <p:cNvPr id="16" name="Picture 15">
+            <a:extLst>
+              <a:ext uri="{FF2B5EF4-FFF2-40B4-BE49-F238E27FC236}">
+                <a16:creationId xmlns:a16="http://schemas.microsoft.com/office/drawing/2014/main" id="{9B0262B8-0755-46E4-8529-4744807760F9}"/>
+              </a:ext>
+            </a:extLst>
+          </p:cNvPr>
+          <p:cNvPicPr>
+            <a:picLocks noChangeAspect="1"/>
+          </p:cNvPicPr>
+          <p:nvPr/>
+        </p:nvPicPr>
+        <p:blipFill>
+          <a:blip r:embed="rId5"/>
+          <a:stretch>
+            <a:fillRect/>
+          </a:stretch>
+        </p:blipFill>
+        <p:spPr>
+          <a:xfrm>
+            <a:off x="2190149" y="715661"/>
+            <a:ext cx="2327682" cy="2211992"/>
+          </a:xfrm>
+          <a:prstGeom prst="rect">
+            <a:avLst/>
+          </a:prstGeom>
+        </p:spPr>
+      </p:pic>
+    </p:spTree>
+    <p:extLst>
+      <p:ext uri="{BB962C8B-B14F-4D97-AF65-F5344CB8AC3E}">
+        <p14:creationId xmlns:p14="http://schemas.microsoft.com/office/powerpoint/2010/main" val="4269537502"/>
+      </p:ext>
+    </p:extLst>
+  </p:cSld>
+  <p:clrMapOvr>
+    <a:masterClrMapping/>
+  </p:clrMapOvr>
+</p:sld>
+</file>
+
 <file path=ppt/theme/theme1.xml><?xml version="1.0" encoding="utf-8"?>
 <a:theme xmlns:a="http://schemas.openxmlformats.org/drawingml/2006/main" name="Office Theme">
   <a:themeElements>

</xml_diff>